<commit_message>
Maybe we dont need the RFMOs in the map
</commit_message>
<xml_diff>
--- a/results/figures/illustrator/fig_1.pptx
+++ b/results/figures/illustrator/fig_1.pptx
@@ -5,13 +5,14 @@
     <p:sldMasterId id="2147483648" r:id="rId1"/>
   </p:sldMasterIdLst>
   <p:notesMasterIdLst>
-    <p:notesMasterId r:id="rId6"/>
+    <p:notesMasterId r:id="rId7"/>
   </p:notesMasterIdLst>
   <p:sldIdLst>
     <p:sldId id="256" r:id="rId2"/>
     <p:sldId id="259" r:id="rId3"/>
-    <p:sldId id="258" r:id="rId4"/>
-    <p:sldId id="257" r:id="rId5"/>
+    <p:sldId id="260" r:id="rId4"/>
+    <p:sldId id="258" r:id="rId5"/>
+    <p:sldId id="257" r:id="rId6"/>
   </p:sldIdLst>
   <p:sldSz cx="12192000" cy="6858000"/>
   <p:notesSz cx="6858000" cy="9144000"/>
@@ -200,7 +201,7 @@
           <a:p>
             <a:fld id="{BDC04606-80EF-5D44-9198-803DFA1FF3B4}" type="datetimeFigureOut">
               <a:rPr lang="pt-BR" smtClean="0"/>
-              <a:t>12/11/2024</a:t>
+              <a:t>20/11/2024</a:t>
             </a:fld>
             <a:endParaRPr lang="pt-BR"/>
           </a:p>
@@ -809,7 +810,7 @@
           <a:p>
             <a:fld id="{6BF8AF09-2E6E-734D-A53B-B5A016D0D6F1}" type="datetimeFigureOut">
               <a:rPr lang="pt-BR" smtClean="0"/>
-              <a:t>12/11/2024</a:t>
+              <a:t>20/11/2024</a:t>
             </a:fld>
             <a:endParaRPr lang="pt-BR"/>
           </a:p>
@@ -1009,7 +1010,7 @@
           <a:p>
             <a:fld id="{6BF8AF09-2E6E-734D-A53B-B5A016D0D6F1}" type="datetimeFigureOut">
               <a:rPr lang="pt-BR" smtClean="0"/>
-              <a:t>12/11/2024</a:t>
+              <a:t>20/11/2024</a:t>
             </a:fld>
             <a:endParaRPr lang="pt-BR"/>
           </a:p>
@@ -1219,7 +1220,7 @@
           <a:p>
             <a:fld id="{6BF8AF09-2E6E-734D-A53B-B5A016D0D6F1}" type="datetimeFigureOut">
               <a:rPr lang="pt-BR" smtClean="0"/>
-              <a:t>12/11/2024</a:t>
+              <a:t>20/11/2024</a:t>
             </a:fld>
             <a:endParaRPr lang="pt-BR"/>
           </a:p>
@@ -1419,7 +1420,7 @@
           <a:p>
             <a:fld id="{6BF8AF09-2E6E-734D-A53B-B5A016D0D6F1}" type="datetimeFigureOut">
               <a:rPr lang="pt-BR" smtClean="0"/>
-              <a:t>12/11/2024</a:t>
+              <a:t>20/11/2024</a:t>
             </a:fld>
             <a:endParaRPr lang="pt-BR"/>
           </a:p>
@@ -1695,7 +1696,7 @@
           <a:p>
             <a:fld id="{6BF8AF09-2E6E-734D-A53B-B5A016D0D6F1}" type="datetimeFigureOut">
               <a:rPr lang="pt-BR" smtClean="0"/>
-              <a:t>12/11/2024</a:t>
+              <a:t>20/11/2024</a:t>
             </a:fld>
             <a:endParaRPr lang="pt-BR"/>
           </a:p>
@@ -1963,7 +1964,7 @@
           <a:p>
             <a:fld id="{6BF8AF09-2E6E-734D-A53B-B5A016D0D6F1}" type="datetimeFigureOut">
               <a:rPr lang="pt-BR" smtClean="0"/>
-              <a:t>12/11/2024</a:t>
+              <a:t>20/11/2024</a:t>
             </a:fld>
             <a:endParaRPr lang="pt-BR"/>
           </a:p>
@@ -2378,7 +2379,7 @@
           <a:p>
             <a:fld id="{6BF8AF09-2E6E-734D-A53B-B5A016D0D6F1}" type="datetimeFigureOut">
               <a:rPr lang="pt-BR" smtClean="0"/>
-              <a:t>12/11/2024</a:t>
+              <a:t>20/11/2024</a:t>
             </a:fld>
             <a:endParaRPr lang="pt-BR"/>
           </a:p>
@@ -2520,7 +2521,7 @@
           <a:p>
             <a:fld id="{6BF8AF09-2E6E-734D-A53B-B5A016D0D6F1}" type="datetimeFigureOut">
               <a:rPr lang="pt-BR" smtClean="0"/>
-              <a:t>12/11/2024</a:t>
+              <a:t>20/11/2024</a:t>
             </a:fld>
             <a:endParaRPr lang="pt-BR"/>
           </a:p>
@@ -2633,7 +2634,7 @@
           <a:p>
             <a:fld id="{6BF8AF09-2E6E-734D-A53B-B5A016D0D6F1}" type="datetimeFigureOut">
               <a:rPr lang="pt-BR" smtClean="0"/>
-              <a:t>12/11/2024</a:t>
+              <a:t>20/11/2024</a:t>
             </a:fld>
             <a:endParaRPr lang="pt-BR"/>
           </a:p>
@@ -2946,7 +2947,7 @@
           <a:p>
             <a:fld id="{6BF8AF09-2E6E-734D-A53B-B5A016D0D6F1}" type="datetimeFigureOut">
               <a:rPr lang="pt-BR" smtClean="0"/>
-              <a:t>12/11/2024</a:t>
+              <a:t>20/11/2024</a:t>
             </a:fld>
             <a:endParaRPr lang="pt-BR"/>
           </a:p>
@@ -3235,7 +3236,7 @@
           <a:p>
             <a:fld id="{6BF8AF09-2E6E-734D-A53B-B5A016D0D6F1}" type="datetimeFigureOut">
               <a:rPr lang="pt-BR" smtClean="0"/>
-              <a:t>12/11/2024</a:t>
+              <a:t>20/11/2024</a:t>
             </a:fld>
             <a:endParaRPr lang="pt-BR"/>
           </a:p>
@@ -3478,7 +3479,7 @@
           <a:p>
             <a:fld id="{6BF8AF09-2E6E-734D-A53B-B5A016D0D6F1}" type="datetimeFigureOut">
               <a:rPr lang="pt-BR" smtClean="0"/>
-              <a:t>12/11/2024</a:t>
+              <a:t>20/11/2024</a:t>
             </a:fld>
             <a:endParaRPr lang="pt-BR"/>
           </a:p>
@@ -4597,6 +4598,175 @@
           <a:chExt cx="0" cy="0"/>
         </a:xfrm>
       </p:grpSpPr>
+      <p:sp>
+        <p:nvSpPr>
+          <p:cNvPr id="6" name="Rectangle 5">
+            <a:extLst>
+              <a:ext uri="{FF2B5EF4-FFF2-40B4-BE49-F238E27FC236}">
+                <a16:creationId xmlns:a16="http://schemas.microsoft.com/office/drawing/2014/main" id="{A74350EB-BAB6-97BA-1A5B-962BC27BBD82}"/>
+              </a:ext>
+            </a:extLst>
+          </p:cNvPr>
+          <p:cNvSpPr/>
+          <p:nvPr/>
+        </p:nvSpPr>
+        <p:spPr>
+          <a:xfrm>
+            <a:off x="-106017" y="-531347"/>
+            <a:ext cx="12298017" cy="9663867"/>
+          </a:xfrm>
+          <a:prstGeom prst="rect">
+            <a:avLst/>
+          </a:prstGeom>
+          <a:solidFill>
+            <a:schemeClr val="bg1"/>
+          </a:solidFill>
+          <a:ln>
+            <a:noFill/>
+          </a:ln>
+        </p:spPr>
+        <p:style>
+          <a:lnRef idx="2">
+            <a:schemeClr val="accent6"/>
+          </a:lnRef>
+          <a:fillRef idx="1">
+            <a:schemeClr val="lt1"/>
+          </a:fillRef>
+          <a:effectRef idx="0">
+            <a:schemeClr val="accent6"/>
+          </a:effectRef>
+          <a:fontRef idx="minor">
+            <a:schemeClr val="dk1"/>
+          </a:fontRef>
+        </p:style>
+        <p:txBody>
+          <a:bodyPr rtlCol="0" anchor="ctr"/>
+          <a:lstStyle/>
+          <a:p>
+            <a:pPr algn="ctr"/>
+            <a:endParaRPr lang="pt-BR" dirty="0"/>
+          </a:p>
+        </p:txBody>
+      </p:sp>
+      <p:pic>
+        <p:nvPicPr>
+          <p:cNvPr id="7" name="Picture 6">
+            <a:extLst>
+              <a:ext uri="{FF2B5EF4-FFF2-40B4-BE49-F238E27FC236}">
+                <a16:creationId xmlns:a16="http://schemas.microsoft.com/office/drawing/2014/main" id="{4EBF98A8-F981-2397-61D4-B5CFEECB6AD6}"/>
+              </a:ext>
+            </a:extLst>
+          </p:cNvPr>
+          <p:cNvPicPr>
+            <a:picLocks noChangeAspect="1"/>
+          </p:cNvPicPr>
+          <p:nvPr/>
+        </p:nvPicPr>
+        <p:blipFill>
+          <a:blip r:embed="rId2"/>
+          <a:srcRect t="89735" b="2967"/>
+          <a:stretch/>
+        </p:blipFill>
+        <p:spPr>
+          <a:xfrm>
+            <a:off x="2512773" y="3838526"/>
+            <a:ext cx="6364836" cy="270980"/>
+          </a:xfrm>
+          <a:prstGeom prst="rect">
+            <a:avLst/>
+          </a:prstGeom>
+        </p:spPr>
+      </p:pic>
+      <p:pic>
+        <p:nvPicPr>
+          <p:cNvPr id="8" name="Picture 7">
+            <a:extLst>
+              <a:ext uri="{FF2B5EF4-FFF2-40B4-BE49-F238E27FC236}">
+                <a16:creationId xmlns:a16="http://schemas.microsoft.com/office/drawing/2014/main" id="{39470B04-4C7A-26AB-1465-BCE5A4B218B4}"/>
+              </a:ext>
+            </a:extLst>
+          </p:cNvPr>
+          <p:cNvPicPr>
+            <a:picLocks noChangeAspect="1"/>
+          </p:cNvPicPr>
+          <p:nvPr/>
+        </p:nvPicPr>
+        <p:blipFill>
+          <a:blip r:embed="rId3"/>
+          <a:stretch>
+            <a:fillRect/>
+          </a:stretch>
+        </p:blipFill>
+        <p:spPr>
+          <a:xfrm>
+            <a:off x="1959497" y="4109506"/>
+            <a:ext cx="7630588" cy="3815294"/>
+          </a:xfrm>
+          <a:prstGeom prst="rect">
+            <a:avLst/>
+          </a:prstGeom>
+        </p:spPr>
+      </p:pic>
+      <p:pic>
+        <p:nvPicPr>
+          <p:cNvPr id="5" name="Picture 4">
+            <a:extLst>
+              <a:ext uri="{FF2B5EF4-FFF2-40B4-BE49-F238E27FC236}">
+                <a16:creationId xmlns:a16="http://schemas.microsoft.com/office/drawing/2014/main" id="{93DE7694-C329-8364-BEC2-CAA81FF01B13}"/>
+              </a:ext>
+            </a:extLst>
+          </p:cNvPr>
+          <p:cNvPicPr>
+            <a:picLocks noChangeAspect="1"/>
+          </p:cNvPicPr>
+          <p:nvPr/>
+        </p:nvPicPr>
+        <p:blipFill>
+          <a:blip r:embed="rId4"/>
+          <a:stretch>
+            <a:fillRect/>
+          </a:stretch>
+        </p:blipFill>
+        <p:spPr>
+          <a:xfrm>
+            <a:off x="1968039" y="-424394"/>
+            <a:ext cx="7772400" cy="4533900"/>
+          </a:xfrm>
+          <a:prstGeom prst="rect">
+            <a:avLst/>
+          </a:prstGeom>
+        </p:spPr>
+      </p:pic>
+    </p:spTree>
+    <p:extLst>
+      <p:ext uri="{BB962C8B-B14F-4D97-AF65-F5344CB8AC3E}">
+        <p14:creationId xmlns:p14="http://schemas.microsoft.com/office/powerpoint/2010/main" val="4110619454"/>
+      </p:ext>
+    </p:extLst>
+  </p:cSld>
+  <p:clrMapOvr>
+    <a:masterClrMapping/>
+  </p:clrMapOvr>
+</p:sld>
+</file>
+
+<file path=ppt/slides/slide4.xml><?xml version="1.0" encoding="utf-8"?>
+<p:sld xmlns:a="http://schemas.openxmlformats.org/drawingml/2006/main" xmlns:r="http://schemas.openxmlformats.org/officeDocument/2006/relationships" xmlns:p="http://schemas.openxmlformats.org/presentationml/2006/main">
+  <p:cSld>
+    <p:spTree>
+      <p:nvGrpSpPr>
+        <p:cNvPr id="1" name=""/>
+        <p:cNvGrpSpPr/>
+        <p:nvPr/>
+      </p:nvGrpSpPr>
+      <p:grpSpPr>
+        <a:xfrm>
+          <a:off x="0" y="0"/>
+          <a:ext cx="0" cy="0"/>
+          <a:chOff x="0" y="0"/>
+          <a:chExt cx="0" cy="0"/>
+        </a:xfrm>
+      </p:grpSpPr>
     </p:spTree>
     <p:extLst>
       <p:ext uri="{BB962C8B-B14F-4D97-AF65-F5344CB8AC3E}">
@@ -4610,7 +4780,7 @@
 </p:sld>
 </file>
 
-<file path=ppt/slides/slide4.xml><?xml version="1.0" encoding="utf-8"?>
+<file path=ppt/slides/slide5.xml><?xml version="1.0" encoding="utf-8"?>
 <p:sld xmlns:a="http://schemas.openxmlformats.org/drawingml/2006/main" xmlns:r="http://schemas.openxmlformats.org/officeDocument/2006/relationships" xmlns:p="http://schemas.openxmlformats.org/presentationml/2006/main">
   <p:cSld>
     <p:spTree>

</xml_diff>

<commit_message>
Updtes fopr technical review
</commit_message>
<xml_diff>
--- a/results/figures/illustrator/fig_1.pptx
+++ b/results/figures/illustrator/fig_1.pptx
@@ -201,7 +201,7 @@
           <a:p>
             <a:fld id="{BDC04606-80EF-5D44-9198-803DFA1FF3B4}" type="datetimeFigureOut">
               <a:rPr lang="pt-BR" smtClean="0"/>
-              <a:t>20/11/2024</a:t>
+              <a:t>17/01/2025</a:t>
             </a:fld>
             <a:endParaRPr lang="pt-BR"/>
           </a:p>
@@ -810,7 +810,7 @@
           <a:p>
             <a:fld id="{6BF8AF09-2E6E-734D-A53B-B5A016D0D6F1}" type="datetimeFigureOut">
               <a:rPr lang="pt-BR" smtClean="0"/>
-              <a:t>20/11/2024</a:t>
+              <a:t>17/01/2025</a:t>
             </a:fld>
             <a:endParaRPr lang="pt-BR"/>
           </a:p>
@@ -1010,7 +1010,7 @@
           <a:p>
             <a:fld id="{6BF8AF09-2E6E-734D-A53B-B5A016D0D6F1}" type="datetimeFigureOut">
               <a:rPr lang="pt-BR" smtClean="0"/>
-              <a:t>20/11/2024</a:t>
+              <a:t>17/01/2025</a:t>
             </a:fld>
             <a:endParaRPr lang="pt-BR"/>
           </a:p>
@@ -1220,7 +1220,7 @@
           <a:p>
             <a:fld id="{6BF8AF09-2E6E-734D-A53B-B5A016D0D6F1}" type="datetimeFigureOut">
               <a:rPr lang="pt-BR" smtClean="0"/>
-              <a:t>20/11/2024</a:t>
+              <a:t>17/01/2025</a:t>
             </a:fld>
             <a:endParaRPr lang="pt-BR"/>
           </a:p>
@@ -1420,7 +1420,7 @@
           <a:p>
             <a:fld id="{6BF8AF09-2E6E-734D-A53B-B5A016D0D6F1}" type="datetimeFigureOut">
               <a:rPr lang="pt-BR" smtClean="0"/>
-              <a:t>20/11/2024</a:t>
+              <a:t>17/01/2025</a:t>
             </a:fld>
             <a:endParaRPr lang="pt-BR"/>
           </a:p>
@@ -1696,7 +1696,7 @@
           <a:p>
             <a:fld id="{6BF8AF09-2E6E-734D-A53B-B5A016D0D6F1}" type="datetimeFigureOut">
               <a:rPr lang="pt-BR" smtClean="0"/>
-              <a:t>20/11/2024</a:t>
+              <a:t>17/01/2025</a:t>
             </a:fld>
             <a:endParaRPr lang="pt-BR"/>
           </a:p>
@@ -1964,7 +1964,7 @@
           <a:p>
             <a:fld id="{6BF8AF09-2E6E-734D-A53B-B5A016D0D6F1}" type="datetimeFigureOut">
               <a:rPr lang="pt-BR" smtClean="0"/>
-              <a:t>20/11/2024</a:t>
+              <a:t>17/01/2025</a:t>
             </a:fld>
             <a:endParaRPr lang="pt-BR"/>
           </a:p>
@@ -2379,7 +2379,7 @@
           <a:p>
             <a:fld id="{6BF8AF09-2E6E-734D-A53B-B5A016D0D6F1}" type="datetimeFigureOut">
               <a:rPr lang="pt-BR" smtClean="0"/>
-              <a:t>20/11/2024</a:t>
+              <a:t>17/01/2025</a:t>
             </a:fld>
             <a:endParaRPr lang="pt-BR"/>
           </a:p>
@@ -2521,7 +2521,7 @@
           <a:p>
             <a:fld id="{6BF8AF09-2E6E-734D-A53B-B5A016D0D6F1}" type="datetimeFigureOut">
               <a:rPr lang="pt-BR" smtClean="0"/>
-              <a:t>20/11/2024</a:t>
+              <a:t>17/01/2025</a:t>
             </a:fld>
             <a:endParaRPr lang="pt-BR"/>
           </a:p>
@@ -2634,7 +2634,7 @@
           <a:p>
             <a:fld id="{6BF8AF09-2E6E-734D-A53B-B5A016D0D6F1}" type="datetimeFigureOut">
               <a:rPr lang="pt-BR" smtClean="0"/>
-              <a:t>20/11/2024</a:t>
+              <a:t>17/01/2025</a:t>
             </a:fld>
             <a:endParaRPr lang="pt-BR"/>
           </a:p>
@@ -2947,7 +2947,7 @@
           <a:p>
             <a:fld id="{6BF8AF09-2E6E-734D-A53B-B5A016D0D6F1}" type="datetimeFigureOut">
               <a:rPr lang="pt-BR" smtClean="0"/>
-              <a:t>20/11/2024</a:t>
+              <a:t>17/01/2025</a:t>
             </a:fld>
             <a:endParaRPr lang="pt-BR"/>
           </a:p>
@@ -3236,7 +3236,7 @@
           <a:p>
             <a:fld id="{6BF8AF09-2E6E-734D-A53B-B5A016D0D6F1}" type="datetimeFigureOut">
               <a:rPr lang="pt-BR" smtClean="0"/>
-              <a:t>20/11/2024</a:t>
+              <a:t>17/01/2025</a:t>
             </a:fld>
             <a:endParaRPr lang="pt-BR"/>
           </a:p>
@@ -3479,7 +3479,7 @@
           <a:p>
             <a:fld id="{6BF8AF09-2E6E-734D-A53B-B5A016D0D6F1}" type="datetimeFigureOut">
               <a:rPr lang="pt-BR" smtClean="0"/>
-              <a:t>20/11/2024</a:t>
+              <a:t>17/01/2025</a:t>
             </a:fld>
             <a:endParaRPr lang="pt-BR"/>
           </a:p>
@@ -4612,7 +4612,7 @@
         </p:nvSpPr>
         <p:spPr>
           <a:xfrm>
-            <a:off x="-106017" y="-531347"/>
+            <a:off x="-106017" y="-541507"/>
             <a:ext cx="12298017" cy="9663867"/>
           </a:xfrm>
           <a:prstGeom prst="rect">
@@ -4679,10 +4679,10 @@
       </p:pic>
       <p:pic>
         <p:nvPicPr>
-          <p:cNvPr id="8" name="Picture 7">
-            <a:extLst>
-              <a:ext uri="{FF2B5EF4-FFF2-40B4-BE49-F238E27FC236}">
-                <a16:creationId xmlns:a16="http://schemas.microsoft.com/office/drawing/2014/main" id="{39470B04-4C7A-26AB-1465-BCE5A4B218B4}"/>
+          <p:cNvPr id="5" name="Picture 4">
+            <a:extLst>
+              <a:ext uri="{FF2B5EF4-FFF2-40B4-BE49-F238E27FC236}">
+                <a16:creationId xmlns:a16="http://schemas.microsoft.com/office/drawing/2014/main" id="{93DE7694-C329-8364-BEC2-CAA81FF01B13}"/>
               </a:ext>
             </a:extLst>
           </p:cNvPr>
@@ -4699,8 +4699,8 @@
         </p:blipFill>
         <p:spPr>
           <a:xfrm>
-            <a:off x="1959497" y="4109506"/>
-            <a:ext cx="7630588" cy="3815294"/>
+            <a:off x="1968039" y="-424394"/>
+            <a:ext cx="7772400" cy="4533900"/>
           </a:xfrm>
           <a:prstGeom prst="rect">
             <a:avLst/>
@@ -4709,10 +4709,10 @@
       </p:pic>
       <p:pic>
         <p:nvPicPr>
-          <p:cNvPr id="5" name="Picture 4">
-            <a:extLst>
-              <a:ext uri="{FF2B5EF4-FFF2-40B4-BE49-F238E27FC236}">
-                <a16:creationId xmlns:a16="http://schemas.microsoft.com/office/drawing/2014/main" id="{93DE7694-C329-8364-BEC2-CAA81FF01B13}"/>
+          <p:cNvPr id="3" name="Picture 2">
+            <a:extLst>
+              <a:ext uri="{FF2B5EF4-FFF2-40B4-BE49-F238E27FC236}">
+                <a16:creationId xmlns:a16="http://schemas.microsoft.com/office/drawing/2014/main" id="{E1CF2FF0-8037-CF1A-5844-6C3E51DB130A}"/>
               </a:ext>
             </a:extLst>
           </p:cNvPr>
@@ -4729,14 +4729,84 @@
         </p:blipFill>
         <p:spPr>
           <a:xfrm>
-            <a:off x="1968039" y="-424394"/>
-            <a:ext cx="7772400" cy="4533900"/>
+            <a:off x="2196639" y="4109506"/>
+            <a:ext cx="7315200" cy="3657600"/>
           </a:xfrm>
           <a:prstGeom prst="rect">
             <a:avLst/>
           </a:prstGeom>
         </p:spPr>
       </p:pic>
+      <p:sp>
+        <p:nvSpPr>
+          <p:cNvPr id="4" name="TextBox 3">
+            <a:extLst>
+              <a:ext uri="{FF2B5EF4-FFF2-40B4-BE49-F238E27FC236}">
+                <a16:creationId xmlns:a16="http://schemas.microsoft.com/office/drawing/2014/main" id="{7D6F33C0-BC8B-769B-FCFD-BF7EDF4A6D5C}"/>
+              </a:ext>
+            </a:extLst>
+          </p:cNvPr>
+          <p:cNvSpPr txBox="1"/>
+          <p:nvPr/>
+        </p:nvSpPr>
+        <p:spPr>
+          <a:xfrm>
+            <a:off x="1878923" y="-419314"/>
+            <a:ext cx="317716" cy="369332"/>
+          </a:xfrm>
+          <a:prstGeom prst="rect">
+            <a:avLst/>
+          </a:prstGeom>
+          <a:noFill/>
+        </p:spPr>
+        <p:txBody>
+          <a:bodyPr wrap="none" rtlCol="0">
+            <a:spAutoFit/>
+          </a:bodyPr>
+          <a:lstStyle/>
+          <a:p>
+            <a:r>
+              <a:rPr lang="en-US" dirty="0"/>
+              <a:t>A</a:t>
+            </a:r>
+          </a:p>
+        </p:txBody>
+      </p:sp>
+      <p:sp>
+        <p:nvSpPr>
+          <p:cNvPr id="9" name="TextBox 8">
+            <a:extLst>
+              <a:ext uri="{FF2B5EF4-FFF2-40B4-BE49-F238E27FC236}">
+                <a16:creationId xmlns:a16="http://schemas.microsoft.com/office/drawing/2014/main" id="{025315B0-3874-AD81-0D8A-82D8496F8E59}"/>
+              </a:ext>
+            </a:extLst>
+          </p:cNvPr>
+          <p:cNvSpPr txBox="1"/>
+          <p:nvPr/>
+        </p:nvSpPr>
+        <p:spPr>
+          <a:xfrm>
+            <a:off x="1878923" y="3798542"/>
+            <a:ext cx="317716" cy="369332"/>
+          </a:xfrm>
+          <a:prstGeom prst="rect">
+            <a:avLst/>
+          </a:prstGeom>
+          <a:noFill/>
+        </p:spPr>
+        <p:txBody>
+          <a:bodyPr wrap="none" rtlCol="0">
+            <a:spAutoFit/>
+          </a:bodyPr>
+          <a:lstStyle/>
+          <a:p>
+            <a:r>
+              <a:rPr lang="en-US" dirty="0"/>
+              <a:t>B</a:t>
+            </a:r>
+          </a:p>
+        </p:txBody>
+      </p:sp>
     </p:spTree>
     <p:extLst>
       <p:ext uri="{BB962C8B-B14F-4D97-AF65-F5344CB8AC3E}">
@@ -4767,6 +4837,41 @@
           <a:chExt cx="0" cy="0"/>
         </a:xfrm>
       </p:grpSpPr>
+      <p:sp>
+        <p:nvSpPr>
+          <p:cNvPr id="2" name="TextBox 1">
+            <a:extLst>
+              <a:ext uri="{FF2B5EF4-FFF2-40B4-BE49-F238E27FC236}">
+                <a16:creationId xmlns:a16="http://schemas.microsoft.com/office/drawing/2014/main" id="{D0489F19-8121-FC02-F434-AE7A6A061584}"/>
+              </a:ext>
+            </a:extLst>
+          </p:cNvPr>
+          <p:cNvSpPr txBox="1"/>
+          <p:nvPr/>
+        </p:nvSpPr>
+        <p:spPr>
+          <a:xfrm>
+            <a:off x="4023360" y="3322320"/>
+            <a:ext cx="317716" cy="369332"/>
+          </a:xfrm>
+          <a:prstGeom prst="rect">
+            <a:avLst/>
+          </a:prstGeom>
+          <a:noFill/>
+        </p:spPr>
+        <p:txBody>
+          <a:bodyPr wrap="none" rtlCol="0">
+            <a:spAutoFit/>
+          </a:bodyPr>
+          <a:lstStyle/>
+          <a:p>
+            <a:r>
+              <a:rPr lang="en-US" dirty="0"/>
+              <a:t>A</a:t>
+            </a:r>
+          </a:p>
+        </p:txBody>
+      </p:sp>
     </p:spTree>
     <p:extLst>
       <p:ext uri="{BB962C8B-B14F-4D97-AF65-F5344CB8AC3E}">

</xml_diff>